<commit_message>
Add slide WebAsebly vs JavaScript
</commit_message>
<xml_diff>
--- a/2022/XMasDev/WebAssembly.pptx
+++ b/2022/XMasDev/WebAssembly.pptx
@@ -5,10 +5,10 @@
     <p:sldMasterId id="2147483660" r:id="rId1"/>
   </p:sldMasterIdLst>
   <p:notesMasterIdLst>
-    <p:notesMasterId r:id="rId14"/>
+    <p:notesMasterId r:id="rId15"/>
   </p:notesMasterIdLst>
   <p:handoutMasterIdLst>
-    <p:handoutMasterId r:id="rId15"/>
+    <p:handoutMasterId r:id="rId16"/>
   </p:handoutMasterIdLst>
   <p:sldIdLst>
     <p:sldId id="264" r:id="rId2"/>
@@ -16,35 +16,36 @@
     <p:sldId id="286" r:id="rId4"/>
     <p:sldId id="280" r:id="rId5"/>
     <p:sldId id="279" r:id="rId6"/>
-    <p:sldId id="274" r:id="rId7"/>
-    <p:sldId id="278" r:id="rId8"/>
-    <p:sldId id="281" r:id="rId9"/>
-    <p:sldId id="271" r:id="rId10"/>
-    <p:sldId id="275" r:id="rId11"/>
-    <p:sldId id="285" r:id="rId12"/>
-    <p:sldId id="276" r:id="rId13"/>
+    <p:sldId id="287" r:id="rId7"/>
+    <p:sldId id="274" r:id="rId8"/>
+    <p:sldId id="278" r:id="rId9"/>
+    <p:sldId id="281" r:id="rId10"/>
+    <p:sldId id="271" r:id="rId11"/>
+    <p:sldId id="275" r:id="rId12"/>
+    <p:sldId id="285" r:id="rId13"/>
+    <p:sldId id="276" r:id="rId14"/>
   </p:sldIdLst>
   <p:sldSz cx="9144000" cy="6858000" type="screen4x3"/>
   <p:notesSz cx="6858000" cy="9144000"/>
   <p:embeddedFontLst>
     <p:embeddedFont>
       <p:font typeface="Calibri" panose="020F0502020204030204" pitchFamily="34" charset="0"/>
-      <p:regular r:id="rId16"/>
-      <p:bold r:id="rId17"/>
-      <p:italic r:id="rId18"/>
-      <p:boldItalic r:id="rId19"/>
+      <p:regular r:id="rId17"/>
+      <p:bold r:id="rId18"/>
+      <p:italic r:id="rId19"/>
+      <p:boldItalic r:id="rId20"/>
     </p:embeddedFont>
     <p:embeddedFont>
       <p:font typeface="Open Sans" panose="020B0606030504020204" pitchFamily="34" charset="0"/>
-      <p:regular r:id="rId20"/>
-      <p:bold r:id="rId21"/>
-      <p:italic r:id="rId22"/>
-      <p:boldItalic r:id="rId23"/>
+      <p:regular r:id="rId21"/>
+      <p:bold r:id="rId22"/>
+      <p:italic r:id="rId23"/>
+      <p:boldItalic r:id="rId24"/>
     </p:embeddedFont>
     <p:embeddedFont>
       <p:font typeface="Open Sans Light" panose="020B0306030504020204" pitchFamily="34" charset="0"/>
-      <p:regular r:id="rId24"/>
-      <p:italic r:id="rId25"/>
+      <p:regular r:id="rId25"/>
+      <p:italic r:id="rId26"/>
     </p:embeddedFont>
   </p:embeddedFontLst>
   <p:defaultTextStyle>
@@ -243,7 +244,7 @@
           <a:p>
             <a:fld id="{DC1D8630-9237-4BE7-9AFA-F1C8E44CEE44}" type="datetimeFigureOut">
               <a:rPr lang="it-IT" smtClean="0"/>
-              <a:t>03/12/2022</a:t>
+              <a:t>04/12/2022</a:t>
             </a:fld>
             <a:endParaRPr lang="it-IT"/>
           </a:p>
@@ -409,7 +410,7 @@
           <a:p>
             <a:fld id="{0B3F9ACC-C21F-4FB7-9E0A-95AB9ECDE2E6}" type="datetimeFigureOut">
               <a:rPr lang="it-IT" smtClean="0"/>
-              <a:t>03/12/2022</a:t>
+              <a:t>04/12/2022</a:t>
             </a:fld>
             <a:endParaRPr lang="it-IT"/>
           </a:p>
@@ -4541,6 +4542,114 @@
           <a:chExt cx="0" cy="0"/>
         </a:xfrm>
       </p:grpSpPr>
+      <p:pic>
+        <p:nvPicPr>
+          <p:cNvPr id="10" name="Immagine 9">
+            <a:extLst>
+              <a:ext uri="{FF2B5EF4-FFF2-40B4-BE49-F238E27FC236}">
+                <a16:creationId xmlns:a16="http://schemas.microsoft.com/office/drawing/2014/main" id="{6692FC1F-7178-3EB7-0BE4-13E99529C75A}"/>
+              </a:ext>
+            </a:extLst>
+          </p:cNvPr>
+          <p:cNvPicPr>
+            <a:picLocks noChangeAspect="1"/>
+          </p:cNvPicPr>
+          <p:nvPr/>
+        </p:nvPicPr>
+        <p:blipFill>
+          <a:blip r:embed="rId2"/>
+          <a:stretch>
+            <a:fillRect/>
+          </a:stretch>
+        </p:blipFill>
+        <p:spPr>
+          <a:xfrm>
+            <a:off x="2247698" y="536206"/>
+            <a:ext cx="4648603" cy="4922947"/>
+          </a:xfrm>
+          <a:prstGeom prst="rect">
+            <a:avLst/>
+          </a:prstGeom>
+        </p:spPr>
+      </p:pic>
+      <p:sp>
+        <p:nvSpPr>
+          <p:cNvPr id="2" name="Segnaposto piè di pagina 2">
+            <a:extLst>
+              <a:ext uri="{FF2B5EF4-FFF2-40B4-BE49-F238E27FC236}">
+                <a16:creationId xmlns:a16="http://schemas.microsoft.com/office/drawing/2014/main" id="{699F2DA1-AF57-021B-766C-214758DC4C95}"/>
+              </a:ext>
+            </a:extLst>
+          </p:cNvPr>
+          <p:cNvSpPr>
+            <a:spLocks noGrp="1"/>
+          </p:cNvSpPr>
+          <p:nvPr>
+            <p:ph type="ftr" sz="quarter" idx="10"/>
+          </p:nvPr>
+        </p:nvSpPr>
+        <p:spPr>
+          <a:xfrm>
+            <a:off x="366122" y="6286803"/>
+            <a:ext cx="7196162" cy="312405"/>
+          </a:xfrm>
+        </p:spPr>
+        <p:txBody>
+          <a:bodyPr/>
+          <a:lstStyle/>
+          <a:p>
+            <a:pPr>
+              <a:defRPr/>
+            </a:pPr>
+            <a:r>
+              <a:rPr lang="en-US" altLang="en-US" dirty="0" err="1"/>
+              <a:t>WebAssembly</a:t>
+            </a:r>
+            <a:r>
+              <a:rPr lang="en-US" altLang="en-US" dirty="0"/>
+              <a:t> – </a:t>
+            </a:r>
+            <a:r>
+              <a:rPr lang="en-US" altLang="en-US" dirty="0" err="1"/>
+              <a:t>XMASDev</a:t>
+            </a:r>
+            <a:r>
+              <a:rPr lang="en-US" altLang="en-US" dirty="0"/>
+              <a:t> 16/12/2022</a:t>
+            </a:r>
+          </a:p>
+        </p:txBody>
+      </p:sp>
+    </p:spTree>
+    <p:extLst>
+      <p:ext uri="{BB962C8B-B14F-4D97-AF65-F5344CB8AC3E}">
+        <p14:creationId xmlns:p14="http://schemas.microsoft.com/office/powerpoint/2010/main" val="2383497189"/>
+      </p:ext>
+    </p:extLst>
+  </p:cSld>
+  <p:clrMapOvr>
+    <a:masterClrMapping/>
+  </p:clrMapOvr>
+</p:sld>
+</file>
+
+<file path=ppt/slides/slide11.xml><?xml version="1.0" encoding="utf-8"?>
+<p:sld xmlns:a="http://schemas.openxmlformats.org/drawingml/2006/main" xmlns:r="http://schemas.openxmlformats.org/officeDocument/2006/relationships" xmlns:p="http://schemas.openxmlformats.org/presentationml/2006/main">
+  <p:cSld>
+    <p:spTree>
+      <p:nvGrpSpPr>
+        <p:cNvPr id="1" name=""/>
+        <p:cNvGrpSpPr/>
+        <p:nvPr/>
+      </p:nvGrpSpPr>
+      <p:grpSpPr>
+        <a:xfrm>
+          <a:off x="0" y="0"/>
+          <a:ext cx="0" cy="0"/>
+          <a:chOff x="0" y="0"/>
+          <a:chExt cx="0" cy="0"/>
+        </a:xfrm>
+      </p:grpSpPr>
       <p:sp>
         <p:nvSpPr>
           <p:cNvPr id="2" name="Titolo 1"/>
@@ -4808,7 +4917,7 @@
 </p:sld>
 </file>
 
-<file path=ppt/slides/slide11.xml><?xml version="1.0" encoding="utf-8"?>
+<file path=ppt/slides/slide12.xml><?xml version="1.0" encoding="utf-8"?>
 <p:sld xmlns:a="http://schemas.openxmlformats.org/drawingml/2006/main" xmlns:r="http://schemas.openxmlformats.org/officeDocument/2006/relationships" xmlns:p="http://schemas.openxmlformats.org/presentationml/2006/main">
   <p:cSld>
     <p:spTree>
@@ -5199,7 +5308,7 @@
 </p:sld>
 </file>
 
-<file path=ppt/slides/slide12.xml><?xml version="1.0" encoding="utf-8"?>
+<file path=ppt/slides/slide13.xml><?xml version="1.0" encoding="utf-8"?>
 <p:sld xmlns:a="http://schemas.openxmlformats.org/drawingml/2006/main" xmlns:r="http://schemas.openxmlformats.org/officeDocument/2006/relationships" xmlns:p="http://schemas.openxmlformats.org/presentationml/2006/main">
   <p:cSld>
     <p:spTree>
@@ -6483,10 +6592,11 @@
       </p:sp>
       <p:pic>
         <p:nvPicPr>
-          <p:cNvPr id="6" name="Immagine 5">
+          <p:cNvPr id="5" name="Immagine 4">
+            <a:hlinkClick r:id="rId2"/>
             <a:extLst>
               <a:ext uri="{FF2B5EF4-FFF2-40B4-BE49-F238E27FC236}">
-                <a16:creationId xmlns:a16="http://schemas.microsoft.com/office/drawing/2014/main" id="{6648E567-4CC2-AE45-FA3B-5159F16F0F79}"/>
+                <a16:creationId xmlns:a16="http://schemas.microsoft.com/office/drawing/2014/main" id="{C5145E14-FD51-E09A-A51A-ACD940DCFFEB}"/>
               </a:ext>
             </a:extLst>
           </p:cNvPr>
@@ -6496,21 +6606,15 @@
           <p:nvPr/>
         </p:nvPicPr>
         <p:blipFill>
-          <a:blip r:embed="rId2">
-            <a:extLst>
-              <a:ext uri="{28A0092B-C50C-407E-A947-70E740481C1C}">
-                <a14:useLocalDpi xmlns:a14="http://schemas.microsoft.com/office/drawing/2010/main" val="0"/>
-              </a:ext>
-            </a:extLst>
-          </a:blip>
+          <a:blip r:embed="rId3"/>
           <a:stretch>
             <a:fillRect/>
           </a:stretch>
         </p:blipFill>
         <p:spPr>
           <a:xfrm>
-            <a:off x="1365443" y="1500973"/>
-            <a:ext cx="6050804" cy="3856054"/>
+            <a:off x="380415" y="1553584"/>
+            <a:ext cx="8383170" cy="3543795"/>
           </a:xfrm>
           <a:prstGeom prst="rect">
             <a:avLst/>
@@ -7242,7 +7346,7 @@
           <a:p>
             <a:r>
               <a:rPr lang="it-IT" sz="3200" dirty="0"/>
-              <a:t>WASI</a:t>
+              <a:t>Sarà la fine di JavaScript?</a:t>
             </a:r>
           </a:p>
         </p:txBody>
@@ -7297,55 +7401,44 @@
       </p:sp>
       <p:pic>
         <p:nvPicPr>
-          <p:cNvPr id="2050" name="Picture 2" descr="Bytecode Alliance">
+          <p:cNvPr id="5" name="Immagine 4">
             <a:extLst>
               <a:ext uri="{FF2B5EF4-FFF2-40B4-BE49-F238E27FC236}">
-                <a16:creationId xmlns:a16="http://schemas.microsoft.com/office/drawing/2014/main" id="{5C714579-BC3A-F36A-0540-35BAE9F50822}"/>
+                <a16:creationId xmlns:a16="http://schemas.microsoft.com/office/drawing/2014/main" id="{B7ED0A96-A6CA-9C19-0496-C21D8482E81B}"/>
               </a:ext>
             </a:extLst>
           </p:cNvPr>
           <p:cNvPicPr>
-            <a:picLocks noChangeAspect="1" noChangeArrowheads="1"/>
+            <a:picLocks noChangeAspect="1"/>
           </p:cNvPicPr>
           <p:nvPr/>
         </p:nvPicPr>
         <p:blipFill>
-          <a:blip r:embed="rId2" cstate="print">
+          <a:blip r:embed="rId2">
             <a:extLst>
               <a:ext uri="{28A0092B-C50C-407E-A947-70E740481C1C}">
                 <a14:useLocalDpi xmlns:a14="http://schemas.microsoft.com/office/drawing/2010/main" val="0"/>
               </a:ext>
             </a:extLst>
           </a:blip>
-          <a:srcRect/>
           <a:stretch>
             <a:fillRect/>
           </a:stretch>
         </p:blipFill>
-        <p:spPr bwMode="auto">
-          <a:xfrm>
-            <a:off x="569346" y="2082832"/>
-            <a:ext cx="8082951" cy="2295525"/>
-          </a:xfrm>
-          <a:prstGeom prst="rect">
-            <a:avLst/>
-          </a:prstGeom>
-          <a:noFill/>
-          <a:extLst>
-            <a:ext uri="{909E8E84-426E-40DD-AFC4-6F175D3DCCD1}">
-              <a14:hiddenFill xmlns:a14="http://schemas.microsoft.com/office/drawing/2010/main">
-                <a:solidFill>
-                  <a:srgbClr val="FFFFFF"/>
-                </a:solidFill>
-              </a14:hiddenFill>
-            </a:ext>
-          </a:extLst>
+        <p:spPr>
+          <a:xfrm>
+            <a:off x="462004" y="1257299"/>
+            <a:ext cx="8402128" cy="4726197"/>
+          </a:xfrm>
+          <a:prstGeom prst="rect">
+            <a:avLst/>
+          </a:prstGeom>
         </p:spPr>
       </p:pic>
     </p:spTree>
     <p:extLst>
       <p:ext uri="{BB962C8B-B14F-4D97-AF65-F5344CB8AC3E}">
-        <p14:creationId xmlns:p14="http://schemas.microsoft.com/office/powerpoint/2010/main" val="1331611757"/>
+        <p14:creationId xmlns:p14="http://schemas.microsoft.com/office/powerpoint/2010/main" val="3820180529"/>
       </p:ext>
     </p:extLst>
   </p:cSld>
@@ -7394,7 +7487,7 @@
           <a:p>
             <a:r>
               <a:rPr lang="it-IT" sz="3200" dirty="0"/>
-              <a:t>WAGI</a:t>
+              <a:t>WASI</a:t>
             </a:r>
           </a:p>
         </p:txBody>
@@ -7449,10 +7542,10 @@
       </p:sp>
       <p:pic>
         <p:nvPicPr>
-          <p:cNvPr id="1026" name="Picture 2" descr="WASM! WASI! WAGI! WAT?">
+          <p:cNvPr id="2050" name="Picture 2" descr="Bytecode Alliance">
             <a:extLst>
               <a:ext uri="{FF2B5EF4-FFF2-40B4-BE49-F238E27FC236}">
-                <a16:creationId xmlns:a16="http://schemas.microsoft.com/office/drawing/2014/main" id="{B52F79BE-1A86-585C-CC1C-98296FE1039E}"/>
+                <a16:creationId xmlns:a16="http://schemas.microsoft.com/office/drawing/2014/main" id="{5C714579-BC3A-F36A-0540-35BAE9F50822}"/>
               </a:ext>
             </a:extLst>
           </p:cNvPr>
@@ -7462,7 +7555,7 @@
           <p:nvPr/>
         </p:nvPicPr>
         <p:blipFill>
-          <a:blip r:embed="rId2">
+          <a:blip r:embed="rId2" cstate="print">
             <a:extLst>
               <a:ext uri="{28A0092B-C50C-407E-A947-70E740481C1C}">
                 <a14:useLocalDpi xmlns:a14="http://schemas.microsoft.com/office/drawing/2010/main" val="0"/>
@@ -7476,8 +7569,8 @@
         </p:blipFill>
         <p:spPr bwMode="auto">
           <a:xfrm>
-            <a:off x="2858218" y="2390592"/>
-            <a:ext cx="3048000" cy="1714500"/>
+            <a:off x="569346" y="2082832"/>
+            <a:ext cx="8082951" cy="2295525"/>
           </a:xfrm>
           <a:prstGeom prst="rect">
             <a:avLst/>
@@ -7497,7 +7590,7 @@
     </p:spTree>
     <p:extLst>
       <p:ext uri="{BB962C8B-B14F-4D97-AF65-F5344CB8AC3E}">
-        <p14:creationId xmlns:p14="http://schemas.microsoft.com/office/powerpoint/2010/main" val="3272564912"/>
+        <p14:creationId xmlns:p14="http://schemas.microsoft.com/office/powerpoint/2010/main" val="1331611757"/>
       </p:ext>
     </p:extLst>
   </p:cSld>
@@ -7545,6 +7638,158 @@
           <a:lstStyle/>
           <a:p>
             <a:r>
+              <a:rPr lang="it-IT" sz="3200" dirty="0"/>
+              <a:t>WAGI</a:t>
+            </a:r>
+          </a:p>
+        </p:txBody>
+      </p:sp>
+      <p:sp>
+        <p:nvSpPr>
+          <p:cNvPr id="3" name="Segnaposto piè di pagina 2">
+            <a:extLst>
+              <a:ext uri="{FF2B5EF4-FFF2-40B4-BE49-F238E27FC236}">
+                <a16:creationId xmlns:a16="http://schemas.microsoft.com/office/drawing/2014/main" id="{014017B1-0D2D-F5B7-2062-FD433A45C4A3}"/>
+              </a:ext>
+            </a:extLst>
+          </p:cNvPr>
+          <p:cNvSpPr>
+            <a:spLocks noGrp="1"/>
+          </p:cNvSpPr>
+          <p:nvPr>
+            <p:ph type="ftr" sz="quarter" idx="10"/>
+          </p:nvPr>
+        </p:nvSpPr>
+        <p:spPr>
+          <a:xfrm>
+            <a:off x="366122" y="6286803"/>
+            <a:ext cx="7196162" cy="312405"/>
+          </a:xfrm>
+        </p:spPr>
+        <p:txBody>
+          <a:bodyPr/>
+          <a:lstStyle/>
+          <a:p>
+            <a:pPr>
+              <a:defRPr/>
+            </a:pPr>
+            <a:r>
+              <a:rPr lang="en-US" altLang="en-US" dirty="0" err="1"/>
+              <a:t>WebAssembly</a:t>
+            </a:r>
+            <a:r>
+              <a:rPr lang="en-US" altLang="en-US" dirty="0"/>
+              <a:t> – </a:t>
+            </a:r>
+            <a:r>
+              <a:rPr lang="en-US" altLang="en-US" dirty="0" err="1"/>
+              <a:t>XMASDev</a:t>
+            </a:r>
+            <a:r>
+              <a:rPr lang="en-US" altLang="en-US" dirty="0"/>
+              <a:t> 16/12/2022</a:t>
+            </a:r>
+          </a:p>
+        </p:txBody>
+      </p:sp>
+      <p:pic>
+        <p:nvPicPr>
+          <p:cNvPr id="1026" name="Picture 2" descr="WASM! WASI! WAGI! WAT?">
+            <a:extLst>
+              <a:ext uri="{FF2B5EF4-FFF2-40B4-BE49-F238E27FC236}">
+                <a16:creationId xmlns:a16="http://schemas.microsoft.com/office/drawing/2014/main" id="{B52F79BE-1A86-585C-CC1C-98296FE1039E}"/>
+              </a:ext>
+            </a:extLst>
+          </p:cNvPr>
+          <p:cNvPicPr>
+            <a:picLocks noChangeAspect="1" noChangeArrowheads="1"/>
+          </p:cNvPicPr>
+          <p:nvPr/>
+        </p:nvPicPr>
+        <p:blipFill>
+          <a:blip r:embed="rId2">
+            <a:extLst>
+              <a:ext uri="{28A0092B-C50C-407E-A947-70E740481C1C}">
+                <a14:useLocalDpi xmlns:a14="http://schemas.microsoft.com/office/drawing/2010/main" val="0"/>
+              </a:ext>
+            </a:extLst>
+          </a:blip>
+          <a:srcRect/>
+          <a:stretch>
+            <a:fillRect/>
+          </a:stretch>
+        </p:blipFill>
+        <p:spPr bwMode="auto">
+          <a:xfrm>
+            <a:off x="2858218" y="2390592"/>
+            <a:ext cx="3048000" cy="1714500"/>
+          </a:xfrm>
+          <a:prstGeom prst="rect">
+            <a:avLst/>
+          </a:prstGeom>
+          <a:noFill/>
+          <a:extLst>
+            <a:ext uri="{909E8E84-426E-40DD-AFC4-6F175D3DCCD1}">
+              <a14:hiddenFill xmlns:a14="http://schemas.microsoft.com/office/drawing/2010/main">
+                <a:solidFill>
+                  <a:srgbClr val="FFFFFF"/>
+                </a:solidFill>
+              </a14:hiddenFill>
+            </a:ext>
+          </a:extLst>
+        </p:spPr>
+      </p:pic>
+    </p:spTree>
+    <p:extLst>
+      <p:ext uri="{BB962C8B-B14F-4D97-AF65-F5344CB8AC3E}">
+        <p14:creationId xmlns:p14="http://schemas.microsoft.com/office/powerpoint/2010/main" val="3272564912"/>
+      </p:ext>
+    </p:extLst>
+  </p:cSld>
+  <p:clrMapOvr>
+    <a:masterClrMapping/>
+  </p:clrMapOvr>
+</p:sld>
+</file>
+
+<file path=ppt/slides/slide9.xml><?xml version="1.0" encoding="utf-8"?>
+<p:sld xmlns:a="http://schemas.openxmlformats.org/drawingml/2006/main" xmlns:r="http://schemas.openxmlformats.org/officeDocument/2006/relationships" xmlns:p="http://schemas.openxmlformats.org/presentationml/2006/main">
+  <p:cSld>
+    <p:spTree>
+      <p:nvGrpSpPr>
+        <p:cNvPr id="1" name=""/>
+        <p:cNvGrpSpPr/>
+        <p:nvPr/>
+      </p:nvGrpSpPr>
+      <p:grpSpPr>
+        <a:xfrm>
+          <a:off x="0" y="0"/>
+          <a:ext cx="0" cy="0"/>
+          <a:chOff x="0" y="0"/>
+          <a:chExt cx="0" cy="0"/>
+        </a:xfrm>
+      </p:grpSpPr>
+      <p:sp>
+        <p:nvSpPr>
+          <p:cNvPr id="2" name="Titolo 1"/>
+          <p:cNvSpPr>
+            <a:spLocks noGrp="1"/>
+          </p:cNvSpPr>
+          <p:nvPr>
+            <p:ph type="ctrTitle"/>
+          </p:nvPr>
+        </p:nvSpPr>
+        <p:spPr>
+          <a:xfrm>
+            <a:off x="470630" y="366550"/>
+            <a:ext cx="8198250" cy="659993"/>
+          </a:xfrm>
+        </p:spPr>
+        <p:txBody>
+          <a:bodyPr/>
+          <a:lstStyle/>
+          <a:p>
+            <a:r>
               <a:rPr lang="it-IT" sz="3200" dirty="0" err="1"/>
               <a:t>WebAssembly</a:t>
             </a:r>
@@ -7654,114 +7899,6 @@
     <p:extLst>
       <p:ext uri="{BB962C8B-B14F-4D97-AF65-F5344CB8AC3E}">
         <p14:creationId xmlns:p14="http://schemas.microsoft.com/office/powerpoint/2010/main" val="2919441373"/>
-      </p:ext>
-    </p:extLst>
-  </p:cSld>
-  <p:clrMapOvr>
-    <a:masterClrMapping/>
-  </p:clrMapOvr>
-</p:sld>
-</file>
-
-<file path=ppt/slides/slide9.xml><?xml version="1.0" encoding="utf-8"?>
-<p:sld xmlns:a="http://schemas.openxmlformats.org/drawingml/2006/main" xmlns:r="http://schemas.openxmlformats.org/officeDocument/2006/relationships" xmlns:p="http://schemas.openxmlformats.org/presentationml/2006/main">
-  <p:cSld>
-    <p:spTree>
-      <p:nvGrpSpPr>
-        <p:cNvPr id="1" name=""/>
-        <p:cNvGrpSpPr/>
-        <p:nvPr/>
-      </p:nvGrpSpPr>
-      <p:grpSpPr>
-        <a:xfrm>
-          <a:off x="0" y="0"/>
-          <a:ext cx="0" cy="0"/>
-          <a:chOff x="0" y="0"/>
-          <a:chExt cx="0" cy="0"/>
-        </a:xfrm>
-      </p:grpSpPr>
-      <p:pic>
-        <p:nvPicPr>
-          <p:cNvPr id="10" name="Immagine 9">
-            <a:extLst>
-              <a:ext uri="{FF2B5EF4-FFF2-40B4-BE49-F238E27FC236}">
-                <a16:creationId xmlns:a16="http://schemas.microsoft.com/office/drawing/2014/main" id="{6692FC1F-7178-3EB7-0BE4-13E99529C75A}"/>
-              </a:ext>
-            </a:extLst>
-          </p:cNvPr>
-          <p:cNvPicPr>
-            <a:picLocks noChangeAspect="1"/>
-          </p:cNvPicPr>
-          <p:nvPr/>
-        </p:nvPicPr>
-        <p:blipFill>
-          <a:blip r:embed="rId2"/>
-          <a:stretch>
-            <a:fillRect/>
-          </a:stretch>
-        </p:blipFill>
-        <p:spPr>
-          <a:xfrm>
-            <a:off x="2247698" y="536206"/>
-            <a:ext cx="4648603" cy="4922947"/>
-          </a:xfrm>
-          <a:prstGeom prst="rect">
-            <a:avLst/>
-          </a:prstGeom>
-        </p:spPr>
-      </p:pic>
-      <p:sp>
-        <p:nvSpPr>
-          <p:cNvPr id="2" name="Segnaposto piè di pagina 2">
-            <a:extLst>
-              <a:ext uri="{FF2B5EF4-FFF2-40B4-BE49-F238E27FC236}">
-                <a16:creationId xmlns:a16="http://schemas.microsoft.com/office/drawing/2014/main" id="{699F2DA1-AF57-021B-766C-214758DC4C95}"/>
-              </a:ext>
-            </a:extLst>
-          </p:cNvPr>
-          <p:cNvSpPr>
-            <a:spLocks noGrp="1"/>
-          </p:cNvSpPr>
-          <p:nvPr>
-            <p:ph type="ftr" sz="quarter" idx="10"/>
-          </p:nvPr>
-        </p:nvSpPr>
-        <p:spPr>
-          <a:xfrm>
-            <a:off x="366122" y="6286803"/>
-            <a:ext cx="7196162" cy="312405"/>
-          </a:xfrm>
-        </p:spPr>
-        <p:txBody>
-          <a:bodyPr/>
-          <a:lstStyle/>
-          <a:p>
-            <a:pPr>
-              <a:defRPr/>
-            </a:pPr>
-            <a:r>
-              <a:rPr lang="en-US" altLang="en-US" dirty="0" err="1"/>
-              <a:t>WebAssembly</a:t>
-            </a:r>
-            <a:r>
-              <a:rPr lang="en-US" altLang="en-US" dirty="0"/>
-              <a:t> – </a:t>
-            </a:r>
-            <a:r>
-              <a:rPr lang="en-US" altLang="en-US" dirty="0" err="1"/>
-              <a:t>XMASDev</a:t>
-            </a:r>
-            <a:r>
-              <a:rPr lang="en-US" altLang="en-US" dirty="0"/>
-              <a:t> 16/12/2022</a:t>
-            </a:r>
-          </a:p>
-        </p:txBody>
-      </p:sp>
-    </p:spTree>
-    <p:extLst>
-      <p:ext uri="{BB962C8B-B14F-4D97-AF65-F5344CB8AC3E}">
-        <p14:creationId xmlns:p14="http://schemas.microsoft.com/office/powerpoint/2010/main" val="2383497189"/>
       </p:ext>
     </p:extLst>
   </p:cSld>

</xml_diff>